<commit_message>
checked and updated d2/s4 slides
</commit_message>
<xml_diff>
--- a/doc/slides/day2/session4/Toolkits.pptx
+++ b/doc/slides/day2/session4/Toolkits.pptx
@@ -1,6 +1,6 @@
 
 <file path=ppt/presentation.xml><?xml version="1.0" encoding="utf-8"?>
-<p:presentation xmlns:a="http://schemas.openxmlformats.org/drawingml/2006/main" xmlns:r="http://schemas.openxmlformats.org/officeDocument/2006/relationships" xmlns:mc="http://schemas.openxmlformats.org/markup-compatibility/2006" xmlns:mv="urn:schemas-microsoft-com:mac:vml" xmlns:p="http://schemas.openxmlformats.org/presentationml/2006/main" mc:Ignorable="mv" mc:PreserveAttributes="mv:*" saveSubsetFonts="1" autoCompressPictures="0">
+<p:presentation xmlns:a="http://schemas.openxmlformats.org/drawingml/2006/main" xmlns:r="http://schemas.openxmlformats.org/officeDocument/2006/relationships" xmlns:p="http://schemas.openxmlformats.org/presentationml/2006/main" saveSubsetFonts="1" autoCompressPictures="0">
   <p:sldMasterIdLst>
     <p:sldMasterId id="2147483648" r:id="rId1"/>
   </p:sldMasterIdLst>
@@ -122,7 +122,7 @@
 </file>
 
 <file path=ppt/notesMasters/notesMaster1.xml><?xml version="1.0" encoding="utf-8"?>
-<p:notesMaster xmlns:a="http://schemas.openxmlformats.org/drawingml/2006/main" xmlns:r="http://schemas.openxmlformats.org/officeDocument/2006/relationships" xmlns:mc="http://schemas.openxmlformats.org/markup-compatibility/2006" xmlns:mv="urn:schemas-microsoft-com:mac:vml" xmlns:p="http://schemas.openxmlformats.org/presentationml/2006/main" mc:Ignorable="mv" mc:PreserveAttributes="mv:*">
+<p:notesMaster xmlns:a="http://schemas.openxmlformats.org/drawingml/2006/main" xmlns:r="http://schemas.openxmlformats.org/officeDocument/2006/relationships" xmlns:p="http://schemas.openxmlformats.org/presentationml/2006/main">
   <p:cSld>
     <p:bg>
       <p:bgRef idx="1001">
@@ -204,7 +204,7 @@
             <a:fld id="{49F2750B-51CC-9342-BA42-3CEC006D4BEE}" type="datetimeFigureOut">
               <a:rPr lang="en-US" smtClean="0"/>
               <a:pPr/>
-              <a:t>9/8/12</a:t>
+              <a:t>10/17/13</a:t>
             </a:fld>
             <a:endParaRPr lang="en-US"/>
           </a:p>
@@ -366,13 +366,18 @@
             <a:fld id="{CFA6B2FE-7F1F-0B44-82E2-C4BAFD29C08F}" type="slidenum">
               <a:rPr lang="en-US" smtClean="0"/>
               <a:pPr/>
-              <a:t>‹#›</a:t>
+              <a:t>‹nr.›</a:t>
             </a:fld>
             <a:endParaRPr lang="en-US"/>
           </a:p>
         </p:txBody>
       </p:sp>
     </p:spTree>
+    <p:extLst>
+      <p:ext uri="{BB962C8B-B14F-4D97-AF65-F5344CB8AC3E}">
+        <p14:creationId xmlns:p14="http://schemas.microsoft.com/office/powerpoint/2010/main" val="2569344065"/>
+      </p:ext>
+    </p:extLst>
   </p:cSld>
   <p:clrMap bg1="lt1" tx1="dk1" bg2="lt2" tx2="dk2" accent1="accent1" accent2="accent2" accent3="accent3" accent4="accent4" accent5="accent5" accent6="accent6" hlink="hlink" folHlink="folHlink"/>
   <p:notesStyle>
@@ -471,7 +476,7 @@
 </file>
 
 <file path=ppt/notesSlides/notesSlide1.xml><?xml version="1.0" encoding="utf-8"?>
-<p:notes xmlns:a="http://schemas.openxmlformats.org/drawingml/2006/main" xmlns:r="http://schemas.openxmlformats.org/officeDocument/2006/relationships" xmlns:mc="http://schemas.openxmlformats.org/markup-compatibility/2006" xmlns:mv="urn:schemas-microsoft-com:mac:vml" xmlns:p="http://schemas.openxmlformats.org/presentationml/2006/main" mc:Ignorable="mv" mc:PreserveAttributes="mv:*">
+<p:notes xmlns:a="http://schemas.openxmlformats.org/drawingml/2006/main" xmlns:r="http://schemas.openxmlformats.org/officeDocument/2006/relationships" xmlns:p="http://schemas.openxmlformats.org/presentationml/2006/main">
   <p:cSld>
     <p:spTree>
       <p:nvGrpSpPr>
@@ -601,7 +606,7 @@
 </file>
 
 <file path=ppt/slideLayouts/slideLayout1.xml><?xml version="1.0" encoding="utf-8"?>
-<p:sldLayout xmlns:a="http://schemas.openxmlformats.org/drawingml/2006/main" xmlns:r="http://schemas.openxmlformats.org/officeDocument/2006/relationships" xmlns:mc="http://schemas.openxmlformats.org/markup-compatibility/2006" xmlns:mv="urn:schemas-microsoft-com:mac:vml" xmlns:p="http://schemas.openxmlformats.org/presentationml/2006/main" mc:Ignorable="mv" mc:PreserveAttributes="mv:*" type="title" preserve="1">
+<p:sldLayout xmlns:a="http://schemas.openxmlformats.org/drawingml/2006/main" xmlns:r="http://schemas.openxmlformats.org/officeDocument/2006/relationships" xmlns:p="http://schemas.openxmlformats.org/presentationml/2006/main" type="title" preserve="1">
   <p:cSld name="Title Slide">
     <p:spTree>
       <p:nvGrpSpPr>
@@ -782,7 +787,7 @@
             <a:fld id="{8B6559E1-F047-C244-B3F0-03E07E42B642}" type="datetimeFigureOut">
               <a:rPr lang="en-US" smtClean="0"/>
               <a:pPr/>
-              <a:t>9/8/12</a:t>
+              <a:t>10/17/13</a:t>
             </a:fld>
             <a:endParaRPr lang="en-US"/>
           </a:p>
@@ -825,7 +830,7 @@
             <a:fld id="{B9C790B2-3A51-F84E-9841-E37E4E0A4957}" type="slidenum">
               <a:rPr lang="en-US" smtClean="0"/>
               <a:pPr/>
-              <a:t>‹#›</a:t>
+              <a:t>‹nr.›</a:t>
             </a:fld>
             <a:endParaRPr lang="en-US"/>
           </a:p>
@@ -840,7 +845,7 @@
 </file>
 
 <file path=ppt/slideLayouts/slideLayout10.xml><?xml version="1.0" encoding="utf-8"?>
-<p:sldLayout xmlns:a="http://schemas.openxmlformats.org/drawingml/2006/main" xmlns:r="http://schemas.openxmlformats.org/officeDocument/2006/relationships" xmlns:mc="http://schemas.openxmlformats.org/markup-compatibility/2006" xmlns:mv="urn:schemas-microsoft-com:mac:vml" xmlns:p="http://schemas.openxmlformats.org/presentationml/2006/main" mc:Ignorable="mv" mc:PreserveAttributes="mv:*" type="vertTx" preserve="1">
+<p:sldLayout xmlns:a="http://schemas.openxmlformats.org/drawingml/2006/main" xmlns:r="http://schemas.openxmlformats.org/officeDocument/2006/relationships" xmlns:p="http://schemas.openxmlformats.org/presentationml/2006/main" type="vertTx" preserve="1">
   <p:cSld name="Title and Vertical Text">
     <p:spTree>
       <p:nvGrpSpPr>
@@ -949,7 +954,7 @@
             <a:fld id="{8B6559E1-F047-C244-B3F0-03E07E42B642}" type="datetimeFigureOut">
               <a:rPr lang="en-US" smtClean="0"/>
               <a:pPr/>
-              <a:t>9/8/12</a:t>
+              <a:t>10/17/13</a:t>
             </a:fld>
             <a:endParaRPr lang="en-US"/>
           </a:p>
@@ -992,7 +997,7 @@
             <a:fld id="{B9C790B2-3A51-F84E-9841-E37E4E0A4957}" type="slidenum">
               <a:rPr lang="en-US" smtClean="0"/>
               <a:pPr/>
-              <a:t>‹#›</a:t>
+              <a:t>‹nr.›</a:t>
             </a:fld>
             <a:endParaRPr lang="en-US"/>
           </a:p>
@@ -1007,7 +1012,7 @@
 </file>
 
 <file path=ppt/slideLayouts/slideLayout11.xml><?xml version="1.0" encoding="utf-8"?>
-<p:sldLayout xmlns:a="http://schemas.openxmlformats.org/drawingml/2006/main" xmlns:r="http://schemas.openxmlformats.org/officeDocument/2006/relationships" xmlns:mc="http://schemas.openxmlformats.org/markup-compatibility/2006" xmlns:mv="urn:schemas-microsoft-com:mac:vml" xmlns:p="http://schemas.openxmlformats.org/presentationml/2006/main" mc:Ignorable="mv" mc:PreserveAttributes="mv:*" type="vertTitleAndTx" preserve="1">
+<p:sldLayout xmlns:a="http://schemas.openxmlformats.org/drawingml/2006/main" xmlns:r="http://schemas.openxmlformats.org/officeDocument/2006/relationships" xmlns:p="http://schemas.openxmlformats.org/presentationml/2006/main" type="vertTitleAndTx" preserve="1">
   <p:cSld name="Vertical Title and Text">
     <p:spTree>
       <p:nvGrpSpPr>
@@ -1126,7 +1131,7 @@
             <a:fld id="{8B6559E1-F047-C244-B3F0-03E07E42B642}" type="datetimeFigureOut">
               <a:rPr lang="en-US" smtClean="0"/>
               <a:pPr/>
-              <a:t>9/8/12</a:t>
+              <a:t>10/17/13</a:t>
             </a:fld>
             <a:endParaRPr lang="en-US"/>
           </a:p>
@@ -1169,7 +1174,7 @@
             <a:fld id="{B9C790B2-3A51-F84E-9841-E37E4E0A4957}" type="slidenum">
               <a:rPr lang="en-US" smtClean="0"/>
               <a:pPr/>
-              <a:t>‹#›</a:t>
+              <a:t>‹nr.›</a:t>
             </a:fld>
             <a:endParaRPr lang="en-US"/>
           </a:p>
@@ -1184,7 +1189,7 @@
 </file>
 
 <file path=ppt/slideLayouts/slideLayout2.xml><?xml version="1.0" encoding="utf-8"?>
-<p:sldLayout xmlns:a="http://schemas.openxmlformats.org/drawingml/2006/main" xmlns:r="http://schemas.openxmlformats.org/officeDocument/2006/relationships" xmlns:mc="http://schemas.openxmlformats.org/markup-compatibility/2006" xmlns:mv="urn:schemas-microsoft-com:mac:vml" xmlns:p="http://schemas.openxmlformats.org/presentationml/2006/main" mc:Ignorable="mv" mc:PreserveAttributes="mv:*" type="obj" preserve="1">
+<p:sldLayout xmlns:a="http://schemas.openxmlformats.org/drawingml/2006/main" xmlns:r="http://schemas.openxmlformats.org/officeDocument/2006/relationships" xmlns:p="http://schemas.openxmlformats.org/presentationml/2006/main" type="obj" preserve="1">
   <p:cSld name="Title and Content">
     <p:spTree>
       <p:nvGrpSpPr>
@@ -1293,7 +1298,7 @@
             <a:fld id="{8B6559E1-F047-C244-B3F0-03E07E42B642}" type="datetimeFigureOut">
               <a:rPr lang="en-US" smtClean="0"/>
               <a:pPr/>
-              <a:t>9/8/12</a:t>
+              <a:t>10/17/13</a:t>
             </a:fld>
             <a:endParaRPr lang="en-US"/>
           </a:p>
@@ -1336,7 +1341,7 @@
             <a:fld id="{B9C790B2-3A51-F84E-9841-E37E4E0A4957}" type="slidenum">
               <a:rPr lang="en-US" smtClean="0"/>
               <a:pPr/>
-              <a:t>‹#›</a:t>
+              <a:t>‹nr.›</a:t>
             </a:fld>
             <a:endParaRPr lang="en-US"/>
           </a:p>
@@ -1351,7 +1356,7 @@
 </file>
 
 <file path=ppt/slideLayouts/slideLayout3.xml><?xml version="1.0" encoding="utf-8"?>
-<p:sldLayout xmlns:a="http://schemas.openxmlformats.org/drawingml/2006/main" xmlns:r="http://schemas.openxmlformats.org/officeDocument/2006/relationships" xmlns:mc="http://schemas.openxmlformats.org/markup-compatibility/2006" xmlns:mv="urn:schemas-microsoft-com:mac:vml" xmlns:p="http://schemas.openxmlformats.org/presentationml/2006/main" mc:Ignorable="mv" mc:PreserveAttributes="mv:*" type="secHead" preserve="1">
+<p:sldLayout xmlns:a="http://schemas.openxmlformats.org/drawingml/2006/main" xmlns:r="http://schemas.openxmlformats.org/officeDocument/2006/relationships" xmlns:p="http://schemas.openxmlformats.org/presentationml/2006/main" type="secHead" preserve="1">
   <p:cSld name="Section Header">
     <p:spTree>
       <p:nvGrpSpPr>
@@ -1536,7 +1541,7 @@
             <a:fld id="{8B6559E1-F047-C244-B3F0-03E07E42B642}" type="datetimeFigureOut">
               <a:rPr lang="en-US" smtClean="0"/>
               <a:pPr/>
-              <a:t>9/8/12</a:t>
+              <a:t>10/17/13</a:t>
             </a:fld>
             <a:endParaRPr lang="en-US"/>
           </a:p>
@@ -1579,7 +1584,7 @@
             <a:fld id="{B9C790B2-3A51-F84E-9841-E37E4E0A4957}" type="slidenum">
               <a:rPr lang="en-US" smtClean="0"/>
               <a:pPr/>
-              <a:t>‹#›</a:t>
+              <a:t>‹nr.›</a:t>
             </a:fld>
             <a:endParaRPr lang="en-US"/>
           </a:p>
@@ -1594,7 +1599,7 @@
 </file>
 
 <file path=ppt/slideLayouts/slideLayout4.xml><?xml version="1.0" encoding="utf-8"?>
-<p:sldLayout xmlns:a="http://schemas.openxmlformats.org/drawingml/2006/main" xmlns:r="http://schemas.openxmlformats.org/officeDocument/2006/relationships" xmlns:mc="http://schemas.openxmlformats.org/markup-compatibility/2006" xmlns:mv="urn:schemas-microsoft-com:mac:vml" xmlns:p="http://schemas.openxmlformats.org/presentationml/2006/main" mc:Ignorable="mv" mc:PreserveAttributes="mv:*" type="twoObj" preserve="1">
+<p:sldLayout xmlns:a="http://schemas.openxmlformats.org/drawingml/2006/main" xmlns:r="http://schemas.openxmlformats.org/officeDocument/2006/relationships" xmlns:p="http://schemas.openxmlformats.org/presentationml/2006/main" type="twoObj" preserve="1">
   <p:cSld name="Two Content">
     <p:spTree>
       <p:nvGrpSpPr>
@@ -1821,7 +1826,7 @@
             <a:fld id="{8B6559E1-F047-C244-B3F0-03E07E42B642}" type="datetimeFigureOut">
               <a:rPr lang="en-US" smtClean="0"/>
               <a:pPr/>
-              <a:t>9/8/12</a:t>
+              <a:t>10/17/13</a:t>
             </a:fld>
             <a:endParaRPr lang="en-US"/>
           </a:p>
@@ -1864,7 +1869,7 @@
             <a:fld id="{B9C790B2-3A51-F84E-9841-E37E4E0A4957}" type="slidenum">
               <a:rPr lang="en-US" smtClean="0"/>
               <a:pPr/>
-              <a:t>‹#›</a:t>
+              <a:t>‹nr.›</a:t>
             </a:fld>
             <a:endParaRPr lang="en-US"/>
           </a:p>
@@ -1879,7 +1884,7 @@
 </file>
 
 <file path=ppt/slideLayouts/slideLayout5.xml><?xml version="1.0" encoding="utf-8"?>
-<p:sldLayout xmlns:a="http://schemas.openxmlformats.org/drawingml/2006/main" xmlns:r="http://schemas.openxmlformats.org/officeDocument/2006/relationships" xmlns:mc="http://schemas.openxmlformats.org/markup-compatibility/2006" xmlns:mv="urn:schemas-microsoft-com:mac:vml" xmlns:p="http://schemas.openxmlformats.org/presentationml/2006/main" mc:Ignorable="mv" mc:PreserveAttributes="mv:*" type="twoTxTwoObj" preserve="1">
+<p:sldLayout xmlns:a="http://schemas.openxmlformats.org/drawingml/2006/main" xmlns:r="http://schemas.openxmlformats.org/officeDocument/2006/relationships" xmlns:p="http://schemas.openxmlformats.org/presentationml/2006/main" type="twoTxTwoObj" preserve="1">
   <p:cSld name="Comparison">
     <p:spTree>
       <p:nvGrpSpPr>
@@ -2240,7 +2245,7 @@
             <a:fld id="{8B6559E1-F047-C244-B3F0-03E07E42B642}" type="datetimeFigureOut">
               <a:rPr lang="en-US" smtClean="0"/>
               <a:pPr/>
-              <a:t>9/8/12</a:t>
+              <a:t>10/17/13</a:t>
             </a:fld>
             <a:endParaRPr lang="en-US"/>
           </a:p>
@@ -2283,7 +2288,7 @@
             <a:fld id="{B9C790B2-3A51-F84E-9841-E37E4E0A4957}" type="slidenum">
               <a:rPr lang="en-US" smtClean="0"/>
               <a:pPr/>
-              <a:t>‹#›</a:t>
+              <a:t>‹nr.›</a:t>
             </a:fld>
             <a:endParaRPr lang="en-US"/>
           </a:p>
@@ -2298,7 +2303,7 @@
 </file>
 
 <file path=ppt/slideLayouts/slideLayout6.xml><?xml version="1.0" encoding="utf-8"?>
-<p:sldLayout xmlns:a="http://schemas.openxmlformats.org/drawingml/2006/main" xmlns:r="http://schemas.openxmlformats.org/officeDocument/2006/relationships" xmlns:mc="http://schemas.openxmlformats.org/markup-compatibility/2006" xmlns:mv="urn:schemas-microsoft-com:mac:vml" xmlns:p="http://schemas.openxmlformats.org/presentationml/2006/main" mc:Ignorable="mv" mc:PreserveAttributes="mv:*" type="titleOnly" preserve="1">
+<p:sldLayout xmlns:a="http://schemas.openxmlformats.org/drawingml/2006/main" xmlns:r="http://schemas.openxmlformats.org/officeDocument/2006/relationships" xmlns:p="http://schemas.openxmlformats.org/presentationml/2006/main" type="titleOnly" preserve="1">
   <p:cSld name="Title Only">
     <p:spTree>
       <p:nvGrpSpPr>
@@ -2355,7 +2360,7 @@
             <a:fld id="{8B6559E1-F047-C244-B3F0-03E07E42B642}" type="datetimeFigureOut">
               <a:rPr lang="en-US" smtClean="0"/>
               <a:pPr/>
-              <a:t>9/8/12</a:t>
+              <a:t>10/17/13</a:t>
             </a:fld>
             <a:endParaRPr lang="en-US"/>
           </a:p>
@@ -2398,7 +2403,7 @@
             <a:fld id="{B9C790B2-3A51-F84E-9841-E37E4E0A4957}" type="slidenum">
               <a:rPr lang="en-US" smtClean="0"/>
               <a:pPr/>
-              <a:t>‹#›</a:t>
+              <a:t>‹nr.›</a:t>
             </a:fld>
             <a:endParaRPr lang="en-US"/>
           </a:p>
@@ -2413,7 +2418,7 @@
 </file>
 
 <file path=ppt/slideLayouts/slideLayout7.xml><?xml version="1.0" encoding="utf-8"?>
-<p:sldLayout xmlns:a="http://schemas.openxmlformats.org/drawingml/2006/main" xmlns:r="http://schemas.openxmlformats.org/officeDocument/2006/relationships" xmlns:mc="http://schemas.openxmlformats.org/markup-compatibility/2006" xmlns:mv="urn:schemas-microsoft-com:mac:vml" xmlns:p="http://schemas.openxmlformats.org/presentationml/2006/main" mc:Ignorable="mv" mc:PreserveAttributes="mv:*" type="blank" preserve="1">
+<p:sldLayout xmlns:a="http://schemas.openxmlformats.org/drawingml/2006/main" xmlns:r="http://schemas.openxmlformats.org/officeDocument/2006/relationships" xmlns:p="http://schemas.openxmlformats.org/presentationml/2006/main" type="blank" preserve="1">
   <p:cSld name="Blank">
     <p:spTree>
       <p:nvGrpSpPr>
@@ -2447,7 +2452,7 @@
             <a:fld id="{8B6559E1-F047-C244-B3F0-03E07E42B642}" type="datetimeFigureOut">
               <a:rPr lang="en-US" smtClean="0"/>
               <a:pPr/>
-              <a:t>9/8/12</a:t>
+              <a:t>10/17/13</a:t>
             </a:fld>
             <a:endParaRPr lang="en-US"/>
           </a:p>
@@ -2490,7 +2495,7 @@
             <a:fld id="{B9C790B2-3A51-F84E-9841-E37E4E0A4957}" type="slidenum">
               <a:rPr lang="en-US" smtClean="0"/>
               <a:pPr/>
-              <a:t>‹#›</a:t>
+              <a:t>‹nr.›</a:t>
             </a:fld>
             <a:endParaRPr lang="en-US"/>
           </a:p>
@@ -2505,7 +2510,7 @@
 </file>
 
 <file path=ppt/slideLayouts/slideLayout8.xml><?xml version="1.0" encoding="utf-8"?>
-<p:sldLayout xmlns:a="http://schemas.openxmlformats.org/drawingml/2006/main" xmlns:r="http://schemas.openxmlformats.org/officeDocument/2006/relationships" xmlns:mc="http://schemas.openxmlformats.org/markup-compatibility/2006" xmlns:mv="urn:schemas-microsoft-com:mac:vml" xmlns:p="http://schemas.openxmlformats.org/presentationml/2006/main" mc:Ignorable="mv" mc:PreserveAttributes="mv:*" type="objTx" preserve="1">
+<p:sldLayout xmlns:a="http://schemas.openxmlformats.org/drawingml/2006/main" xmlns:r="http://schemas.openxmlformats.org/officeDocument/2006/relationships" xmlns:p="http://schemas.openxmlformats.org/presentationml/2006/main" type="objTx" preserve="1">
   <p:cSld name="Content with Caption">
     <p:spTree>
       <p:nvGrpSpPr>
@@ -2721,7 +2726,7 @@
             <a:fld id="{8B6559E1-F047-C244-B3F0-03E07E42B642}" type="datetimeFigureOut">
               <a:rPr lang="en-US" smtClean="0"/>
               <a:pPr/>
-              <a:t>9/8/12</a:t>
+              <a:t>10/17/13</a:t>
             </a:fld>
             <a:endParaRPr lang="en-US"/>
           </a:p>
@@ -2764,7 +2769,7 @@
             <a:fld id="{B9C790B2-3A51-F84E-9841-E37E4E0A4957}" type="slidenum">
               <a:rPr lang="en-US" smtClean="0"/>
               <a:pPr/>
-              <a:t>‹#›</a:t>
+              <a:t>‹nr.›</a:t>
             </a:fld>
             <a:endParaRPr lang="en-US"/>
           </a:p>
@@ -2779,7 +2784,7 @@
 </file>
 
 <file path=ppt/slideLayouts/slideLayout9.xml><?xml version="1.0" encoding="utf-8"?>
-<p:sldLayout xmlns:a="http://schemas.openxmlformats.org/drawingml/2006/main" xmlns:r="http://schemas.openxmlformats.org/officeDocument/2006/relationships" xmlns:mc="http://schemas.openxmlformats.org/markup-compatibility/2006" xmlns:mv="urn:schemas-microsoft-com:mac:vml" xmlns:p="http://schemas.openxmlformats.org/presentationml/2006/main" mc:Ignorable="mv" mc:PreserveAttributes="mv:*" type="picTx" preserve="1">
+<p:sldLayout xmlns:a="http://schemas.openxmlformats.org/drawingml/2006/main" xmlns:r="http://schemas.openxmlformats.org/officeDocument/2006/relationships" xmlns:p="http://schemas.openxmlformats.org/presentationml/2006/main" type="picTx" preserve="1">
   <p:cSld name="Picture with Caption">
     <p:spTree>
       <p:nvGrpSpPr>
@@ -2971,7 +2976,7 @@
             <a:fld id="{8B6559E1-F047-C244-B3F0-03E07E42B642}" type="datetimeFigureOut">
               <a:rPr lang="en-US" smtClean="0"/>
               <a:pPr/>
-              <a:t>9/8/12</a:t>
+              <a:t>10/17/13</a:t>
             </a:fld>
             <a:endParaRPr lang="en-US"/>
           </a:p>
@@ -3014,7 +3019,7 @@
             <a:fld id="{B9C790B2-3A51-F84E-9841-E37E4E0A4957}" type="slidenum">
               <a:rPr lang="en-US" smtClean="0"/>
               <a:pPr/>
-              <a:t>‹#›</a:t>
+              <a:t>‹nr.›</a:t>
             </a:fld>
             <a:endParaRPr lang="en-US"/>
           </a:p>
@@ -3029,7 +3034,7 @@
 </file>
 
 <file path=ppt/slideMasters/slideMaster1.xml><?xml version="1.0" encoding="utf-8"?>
-<p:sldMaster xmlns:a="http://schemas.openxmlformats.org/drawingml/2006/main" xmlns:r="http://schemas.openxmlformats.org/officeDocument/2006/relationships" xmlns:mc="http://schemas.openxmlformats.org/markup-compatibility/2006" xmlns:mv="urn:schemas-microsoft-com:mac:vml" xmlns:p="http://schemas.openxmlformats.org/presentationml/2006/main" mc:Ignorable="mv" mc:PreserveAttributes="mv:*">
+<p:sldMaster xmlns:a="http://schemas.openxmlformats.org/drawingml/2006/main" xmlns:r="http://schemas.openxmlformats.org/officeDocument/2006/relationships" xmlns:p="http://schemas.openxmlformats.org/presentationml/2006/main">
   <p:cSld>
     <p:bg>
       <p:bgRef idx="1001">
@@ -3181,7 +3186,7 @@
             <a:fld id="{8B6559E1-F047-C244-B3F0-03E07E42B642}" type="datetimeFigureOut">
               <a:rPr lang="en-US" smtClean="0"/>
               <a:pPr/>
-              <a:t>9/8/12</a:t>
+              <a:t>10/17/13</a:t>
             </a:fld>
             <a:endParaRPr lang="en-US"/>
           </a:p>
@@ -3260,7 +3265,7 @@
             <a:fld id="{B9C790B2-3A51-F84E-9841-E37E4E0A4957}" type="slidenum">
               <a:rPr lang="en-US" smtClean="0"/>
               <a:pPr/>
-              <a:t>‹#›</a:t>
+              <a:t>‹nr.›</a:t>
             </a:fld>
             <a:endParaRPr lang="en-US"/>
           </a:p>
@@ -3536,7 +3541,7 @@
 </file>
 
 <file path=ppt/slides/slide1.xml><?xml version="1.0" encoding="utf-8"?>
-<p:sld xmlns:a="http://schemas.openxmlformats.org/drawingml/2006/main" xmlns:r="http://schemas.openxmlformats.org/officeDocument/2006/relationships" xmlns:mc="http://schemas.openxmlformats.org/markup-compatibility/2006" xmlns:mv="urn:schemas-microsoft-com:mac:vml" xmlns:p="http://schemas.openxmlformats.org/presentationml/2006/main" mc:Ignorable="mv" mc:PreserveAttributes="mv:*">
+<p:sld xmlns:a="http://schemas.openxmlformats.org/drawingml/2006/main" xmlns:r="http://schemas.openxmlformats.org/officeDocument/2006/relationships" xmlns:p="http://schemas.openxmlformats.org/presentationml/2006/main">
   <p:cSld>
     <p:spTree>
       <p:nvGrpSpPr>
@@ -3590,22 +3595,6 @@
           <a:bodyPr/>
           <a:lstStyle/>
           <a:p>
-            <a:r>
-              <a:rPr lang="en-US" dirty="0" smtClean="0"/>
-              <a:t>12 September 2012</a:t>
-            </a:r>
-            <a:r>
-              <a:rPr lang="en-US" smtClean="0"/>
-              <a:t>, </a:t>
-            </a:r>
-            <a:r>
-              <a:rPr lang="en-US" smtClean="0"/>
-              <a:t>11.45-</a:t>
-            </a:r>
-            <a:r>
-              <a:rPr lang="en-US" dirty="0" smtClean="0"/>
-              <a:t>12.30</a:t>
-            </a:r>
             <a:endParaRPr lang="en-US" dirty="0"/>
           </a:p>
         </p:txBody>
@@ -3618,7 +3607,7 @@
   <p:timing>
     <p:tnLst>
       <p:par>
-        <p:cTn id="1" dur="indefinite" restart="never" nodeType="tmRoot"/>
+        <p:cTn xmlns:p14="http://schemas.microsoft.com/office/powerpoint/2010/main" id="1" dur="indefinite" restart="never" nodeType="tmRoot"/>
       </p:par>
     </p:tnLst>
   </p:timing>
@@ -3626,7 +3615,7 @@
 </file>
 
 <file path=ppt/slides/slide10.xml><?xml version="1.0" encoding="utf-8"?>
-<p:sld xmlns:a="http://schemas.openxmlformats.org/drawingml/2006/main" xmlns:r="http://schemas.openxmlformats.org/officeDocument/2006/relationships" xmlns:mc="http://schemas.openxmlformats.org/markup-compatibility/2006" xmlns:mv="urn:schemas-microsoft-com:mac:vml" xmlns:p="http://schemas.openxmlformats.org/presentationml/2006/main" mc:Ignorable="mv" mc:PreserveAttributes="mv:*">
+<p:sld xmlns:a="http://schemas.openxmlformats.org/drawingml/2006/main" xmlns:r="http://schemas.openxmlformats.org/officeDocument/2006/relationships" xmlns:p="http://schemas.openxmlformats.org/presentationml/2006/main">
   <p:cSld>
     <p:spTree>
       <p:nvGrpSpPr>
@@ -3808,7 +3797,7 @@
   <p:timing>
     <p:tnLst>
       <p:par>
-        <p:cTn id="1" dur="indefinite" restart="never" nodeType="tmRoot"/>
+        <p:cTn xmlns:p14="http://schemas.microsoft.com/office/powerpoint/2010/main" id="1" dur="indefinite" restart="never" nodeType="tmRoot"/>
       </p:par>
     </p:tnLst>
   </p:timing>
@@ -3816,7 +3805,7 @@
 </file>
 
 <file path=ppt/slides/slide11.xml><?xml version="1.0" encoding="utf-8"?>
-<p:sld xmlns:a="http://schemas.openxmlformats.org/drawingml/2006/main" xmlns:r="http://schemas.openxmlformats.org/officeDocument/2006/relationships" xmlns:mc="http://schemas.openxmlformats.org/markup-compatibility/2006" xmlns:mv="urn:schemas-microsoft-com:mac:vml" xmlns:p="http://schemas.openxmlformats.org/presentationml/2006/main" mc:Ignorable="mv" mc:PreserveAttributes="mv:*">
+<p:sld xmlns:a="http://schemas.openxmlformats.org/drawingml/2006/main" xmlns:r="http://schemas.openxmlformats.org/officeDocument/2006/relationships" xmlns:p="http://schemas.openxmlformats.org/presentationml/2006/main">
   <p:cSld>
     <p:spTree>
       <p:nvGrpSpPr>
@@ -3949,7 +3938,7 @@
   <p:timing>
     <p:tnLst>
       <p:par>
-        <p:cTn id="1" dur="indefinite" restart="never" nodeType="tmRoot"/>
+        <p:cTn xmlns:p14="http://schemas.microsoft.com/office/powerpoint/2010/main" id="1" dur="indefinite" restart="never" nodeType="tmRoot"/>
       </p:par>
     </p:tnLst>
   </p:timing>
@@ -3957,7 +3946,7 @@
 </file>
 
 <file path=ppt/slides/slide12.xml><?xml version="1.0" encoding="utf-8"?>
-<p:sld xmlns:a="http://schemas.openxmlformats.org/drawingml/2006/main" xmlns:r="http://schemas.openxmlformats.org/officeDocument/2006/relationships" xmlns:mc="http://schemas.openxmlformats.org/markup-compatibility/2006" xmlns:mv="urn:schemas-microsoft-com:mac:vml" xmlns:p="http://schemas.openxmlformats.org/presentationml/2006/main" mc:Ignorable="mv" mc:PreserveAttributes="mv:*">
+<p:sld xmlns:a="http://schemas.openxmlformats.org/drawingml/2006/main" xmlns:r="http://schemas.openxmlformats.org/officeDocument/2006/relationships" xmlns:p="http://schemas.openxmlformats.org/presentationml/2006/main">
   <p:cSld>
     <p:spTree>
       <p:nvGrpSpPr>
@@ -4062,34 +4051,16 @@
               <a:buAutoNum type="arabicPeriod"/>
             </a:pPr>
             <a:r>
-              <a:rPr lang="en-US" dirty="0" err="1" smtClean="0"/>
-              <a:t>BioRuby</a:t>
-            </a:r>
-            <a:r>
-              <a:rPr lang="en-US" dirty="0" smtClean="0"/>
-              <a:t> (</a:t>
-            </a:r>
-            <a:r>
-              <a:rPr lang="en-US" dirty="0" err="1" smtClean="0"/>
-              <a:t>bioruby-ngs</a:t>
-            </a:r>
-            <a:r>
-              <a:rPr lang="en-US" dirty="0" smtClean="0"/>
-              <a:t>)</a:t>
-            </a:r>
-          </a:p>
-          <a:p>
-            <a:pPr marL="514350" indent="-514350">
-              <a:buFont typeface="+mj-lt"/>
-              <a:buAutoNum type="arabicPeriod"/>
-            </a:pPr>
-            <a:r>
-              <a:rPr lang="en-US" dirty="0" err="1" smtClean="0"/>
+              <a:rPr lang="en-US" smtClean="0"/>
               <a:t>BioConductor</a:t>
             </a:r>
             <a:r>
               <a:rPr lang="en-US" dirty="0" smtClean="0"/>
-              <a:t> (</a:t>
+              <a:t> </a:t>
+            </a:r>
+            <a:r>
+              <a:rPr lang="en-US" dirty="0" smtClean="0"/>
+              <a:t>(</a:t>
             </a:r>
             <a:r>
               <a:rPr lang="en-US" dirty="0" err="1" smtClean="0"/>
@@ -4111,7 +4082,7 @@
   <p:timing>
     <p:tnLst>
       <p:par>
-        <p:cTn id="1" dur="indefinite" restart="never" nodeType="tmRoot"/>
+        <p:cTn xmlns:p14="http://schemas.microsoft.com/office/powerpoint/2010/main" id="1" dur="indefinite" restart="never" nodeType="tmRoot"/>
       </p:par>
     </p:tnLst>
   </p:timing>
@@ -4119,7 +4090,7 @@
 </file>
 
 <file path=ppt/slides/slide2.xml><?xml version="1.0" encoding="utf-8"?>
-<p:sld xmlns:a="http://schemas.openxmlformats.org/drawingml/2006/main" xmlns:r="http://schemas.openxmlformats.org/officeDocument/2006/relationships" xmlns:mc="http://schemas.openxmlformats.org/markup-compatibility/2006" xmlns:mv="urn:schemas-microsoft-com:mac:vml" xmlns:p="http://schemas.openxmlformats.org/presentationml/2006/main" mc:Ignorable="mv" mc:PreserveAttributes="mv:*">
+<p:sld xmlns:a="http://schemas.openxmlformats.org/drawingml/2006/main" xmlns:r="http://schemas.openxmlformats.org/officeDocument/2006/relationships" xmlns:p="http://schemas.openxmlformats.org/presentationml/2006/main">
   <p:cSld>
     <p:spTree>
       <p:nvGrpSpPr>
@@ -4175,7 +4146,19 @@
           <a:p>
             <a:r>
               <a:rPr lang="en-US" dirty="0" smtClean="0"/>
-              <a:t>Different from imperative programming, object-oriented programming models domain concepts (e.g. sequences, taxa) as objects with behaviors.</a:t>
+              <a:t>Different from imperative programming, object-oriented programming models domain concepts (e.g. sequences, </a:t>
+            </a:r>
+            <a:r>
+              <a:rPr lang="en-US" dirty="0" smtClean="0"/>
+              <a:t>alignments, features</a:t>
+            </a:r>
+            <a:r>
+              <a:rPr lang="en-US" dirty="0" smtClean="0"/>
+              <a:t>) </a:t>
+            </a:r>
+            <a:r>
+              <a:rPr lang="en-US" dirty="0" smtClean="0"/>
+              <a:t>as objects with behaviors.</a:t>
             </a:r>
           </a:p>
           <a:p>
@@ -4195,7 +4178,7 @@
   <p:timing>
     <p:tnLst>
       <p:par>
-        <p:cTn id="1" dur="indefinite" restart="never" nodeType="tmRoot"/>
+        <p:cTn xmlns:p14="http://schemas.microsoft.com/office/powerpoint/2010/main" id="1" dur="indefinite" restart="never" nodeType="tmRoot"/>
       </p:par>
     </p:tnLst>
   </p:timing>
@@ -4203,7 +4186,7 @@
 </file>
 
 <file path=ppt/slides/slide3.xml><?xml version="1.0" encoding="utf-8"?>
-<p:sld xmlns:a="http://schemas.openxmlformats.org/drawingml/2006/main" xmlns:r="http://schemas.openxmlformats.org/officeDocument/2006/relationships" xmlns:mc="http://schemas.openxmlformats.org/markup-compatibility/2006" xmlns:mv="urn:schemas-microsoft-com:mac:vml" xmlns:p="http://schemas.openxmlformats.org/presentationml/2006/main" mc:Ignorable="mv" mc:PreserveAttributes="mv:*">
+<p:sld xmlns:a="http://schemas.openxmlformats.org/drawingml/2006/main" xmlns:r="http://schemas.openxmlformats.org/officeDocument/2006/relationships" xmlns:p="http://schemas.openxmlformats.org/presentationml/2006/main">
   <p:cSld>
     <p:spTree>
       <p:nvGrpSpPr>
@@ -4318,7 +4301,7 @@
   <p:timing>
     <p:tnLst>
       <p:par>
-        <p:cTn id="1" dur="indefinite" restart="never" nodeType="tmRoot"/>
+        <p:cTn xmlns:p14="http://schemas.microsoft.com/office/powerpoint/2010/main" id="1" dur="indefinite" restart="never" nodeType="tmRoot"/>
       </p:par>
     </p:tnLst>
   </p:timing>
@@ -4326,7 +4309,7 @@
 </file>
 
 <file path=ppt/slides/slide4.xml><?xml version="1.0" encoding="utf-8"?>
-<p:sld xmlns:a="http://schemas.openxmlformats.org/drawingml/2006/main" xmlns:r="http://schemas.openxmlformats.org/officeDocument/2006/relationships" xmlns:mc="http://schemas.openxmlformats.org/markup-compatibility/2006" xmlns:mv="urn:schemas-microsoft-com:mac:vml" xmlns:p="http://schemas.openxmlformats.org/presentationml/2006/main" mc:Ignorable="mv" mc:PreserveAttributes="mv:*">
+<p:sld xmlns:a="http://schemas.openxmlformats.org/drawingml/2006/main" xmlns:r="http://schemas.openxmlformats.org/officeDocument/2006/relationships" xmlns:p="http://schemas.openxmlformats.org/presentationml/2006/main">
   <p:cSld>
     <p:spTree>
       <p:nvGrpSpPr>
@@ -4437,7 +4420,11 @@
             <a:pPr lvl="1"/>
             <a:r>
               <a:rPr lang="en-US" dirty="0" smtClean="0"/>
-              <a:t>Losing momentum</a:t>
+              <a:t>Losing </a:t>
+            </a:r>
+            <a:r>
+              <a:rPr lang="en-US" dirty="0" smtClean="0"/>
+              <a:t>momentum?</a:t>
             </a:r>
             <a:endParaRPr lang="en-US" dirty="0"/>
           </a:p>
@@ -4505,7 +4492,7 @@
   <p:timing>
     <p:tnLst>
       <p:par>
-        <p:cTn id="1" dur="indefinite" restart="never" nodeType="tmRoot"/>
+        <p:cTn xmlns:p14="http://schemas.microsoft.com/office/powerpoint/2010/main" id="1" dur="indefinite" restart="never" nodeType="tmRoot"/>
       </p:par>
     </p:tnLst>
   </p:timing>
@@ -4513,7 +4500,7 @@
 </file>
 
 <file path=ppt/slides/slide5.xml><?xml version="1.0" encoding="utf-8"?>
-<p:sld xmlns:a="http://schemas.openxmlformats.org/drawingml/2006/main" xmlns:r="http://schemas.openxmlformats.org/officeDocument/2006/relationships" xmlns:mc="http://schemas.openxmlformats.org/markup-compatibility/2006" xmlns:mv="urn:schemas-microsoft-com:mac:vml" xmlns:p="http://schemas.openxmlformats.org/presentationml/2006/main" mc:Ignorable="mv" mc:PreserveAttributes="mv:*">
+<p:sld xmlns:a="http://schemas.openxmlformats.org/drawingml/2006/main" xmlns:r="http://schemas.openxmlformats.org/officeDocument/2006/relationships" xmlns:p="http://schemas.openxmlformats.org/presentationml/2006/main">
   <p:cSld>
     <p:spTree>
       <p:nvGrpSpPr>
@@ -4706,7 +4693,7 @@
   <p:timing>
     <p:tnLst>
       <p:par>
-        <p:cTn id="1" dur="indefinite" restart="never" nodeType="tmRoot"/>
+        <p:cTn xmlns:p14="http://schemas.microsoft.com/office/powerpoint/2010/main" id="1" dur="indefinite" restart="never" nodeType="tmRoot"/>
       </p:par>
     </p:tnLst>
   </p:timing>
@@ -4714,7 +4701,7 @@
 </file>
 
 <file path=ppt/slides/slide6.xml><?xml version="1.0" encoding="utf-8"?>
-<p:sld xmlns:a="http://schemas.openxmlformats.org/drawingml/2006/main" xmlns:r="http://schemas.openxmlformats.org/officeDocument/2006/relationships" xmlns:mc="http://schemas.openxmlformats.org/markup-compatibility/2006" xmlns:mv="urn:schemas-microsoft-com:mac:vml" xmlns:p="http://schemas.openxmlformats.org/presentationml/2006/main" mc:Ignorable="mv" mc:PreserveAttributes="mv:*">
+<p:sld xmlns:a="http://schemas.openxmlformats.org/drawingml/2006/main" xmlns:r="http://schemas.openxmlformats.org/officeDocument/2006/relationships" xmlns:p="http://schemas.openxmlformats.org/presentationml/2006/main">
   <p:cSld>
     <p:spTree>
       <p:nvGrpSpPr>
@@ -4894,7 +4881,7 @@
   <p:timing>
     <p:tnLst>
       <p:par>
-        <p:cTn id="1" dur="indefinite" restart="never" nodeType="tmRoot"/>
+        <p:cTn xmlns:p14="http://schemas.microsoft.com/office/powerpoint/2010/main" id="1" dur="indefinite" restart="never" nodeType="tmRoot"/>
       </p:par>
     </p:tnLst>
   </p:timing>
@@ -4902,7 +4889,7 @@
 </file>
 
 <file path=ppt/slides/slide7.xml><?xml version="1.0" encoding="utf-8"?>
-<p:sld xmlns:a="http://schemas.openxmlformats.org/drawingml/2006/main" xmlns:r="http://schemas.openxmlformats.org/officeDocument/2006/relationships" xmlns:mc="http://schemas.openxmlformats.org/markup-compatibility/2006" xmlns:mv="urn:schemas-microsoft-com:mac:vml" xmlns:p="http://schemas.openxmlformats.org/presentationml/2006/main" mc:Ignorable="mv" mc:PreserveAttributes="mv:*">
+<p:sld xmlns:a="http://schemas.openxmlformats.org/drawingml/2006/main" xmlns:r="http://schemas.openxmlformats.org/officeDocument/2006/relationships" xmlns:p="http://schemas.openxmlformats.org/presentationml/2006/main">
   <p:cSld>
     <p:spTree>
       <p:nvGrpSpPr>
@@ -5046,7 +5033,7 @@
   <p:timing>
     <p:tnLst>
       <p:par>
-        <p:cTn id="1" dur="indefinite" restart="never" nodeType="tmRoot"/>
+        <p:cTn xmlns:p14="http://schemas.microsoft.com/office/powerpoint/2010/main" id="1" dur="indefinite" restart="never" nodeType="tmRoot"/>
       </p:par>
     </p:tnLst>
   </p:timing>
@@ -5054,7 +5041,7 @@
 </file>
 
 <file path=ppt/slides/slide8.xml><?xml version="1.0" encoding="utf-8"?>
-<p:sld xmlns:a="http://schemas.openxmlformats.org/drawingml/2006/main" xmlns:r="http://schemas.openxmlformats.org/officeDocument/2006/relationships" xmlns:mc="http://schemas.openxmlformats.org/markup-compatibility/2006" xmlns:mv="urn:schemas-microsoft-com:mac:vml" xmlns:p="http://schemas.openxmlformats.org/presentationml/2006/main" mc:Ignorable="mv" mc:PreserveAttributes="mv:*">
+<p:sld xmlns:a="http://schemas.openxmlformats.org/drawingml/2006/main" xmlns:r="http://schemas.openxmlformats.org/officeDocument/2006/relationships" xmlns:p="http://schemas.openxmlformats.org/presentationml/2006/main">
   <p:cSld>
     <p:spTree>
       <p:nvGrpSpPr>
@@ -5106,7 +5093,7 @@
         <p:spPr/>
         <p:txBody>
           <a:bodyPr>
-            <a:normAutofit lnSpcReduction="10000"/>
+            <a:normAutofit fontScale="92500"/>
           </a:bodyPr>
           <a:lstStyle/>
           <a:p>
@@ -5190,7 +5177,7 @@
         <p:spPr/>
         <p:txBody>
           <a:bodyPr>
-            <a:normAutofit lnSpcReduction="10000"/>
+            <a:normAutofit fontScale="92500"/>
           </a:bodyPr>
           <a:lstStyle/>
           <a:p>
@@ -5239,7 +5226,7 @@
   <p:timing>
     <p:tnLst>
       <p:par>
-        <p:cTn id="1" dur="indefinite" restart="never" nodeType="tmRoot"/>
+        <p:cTn xmlns:p14="http://schemas.microsoft.com/office/powerpoint/2010/main" id="1" dur="indefinite" restart="never" nodeType="tmRoot"/>
       </p:par>
     </p:tnLst>
   </p:timing>
@@ -5247,7 +5234,7 @@
 </file>
 
 <file path=ppt/slides/slide9.xml><?xml version="1.0" encoding="utf-8"?>
-<p:sld xmlns:a="http://schemas.openxmlformats.org/drawingml/2006/main" xmlns:r="http://schemas.openxmlformats.org/officeDocument/2006/relationships" xmlns:mc="http://schemas.openxmlformats.org/markup-compatibility/2006" xmlns:mv="urn:schemas-microsoft-com:mac:vml" xmlns:p="http://schemas.openxmlformats.org/presentationml/2006/main" mc:Ignorable="mv" mc:PreserveAttributes="mv:*">
+<p:sld xmlns:a="http://schemas.openxmlformats.org/drawingml/2006/main" xmlns:r="http://schemas.openxmlformats.org/officeDocument/2006/relationships" xmlns:p="http://schemas.openxmlformats.org/presentationml/2006/main">
   <p:cSld>
     <p:spTree>
       <p:nvGrpSpPr>
@@ -5439,7 +5426,7 @@
   <p:timing>
     <p:tnLst>
       <p:par>
-        <p:cTn id="1" dur="indefinite" restart="never" nodeType="tmRoot"/>
+        <p:cTn xmlns:p14="http://schemas.microsoft.com/office/powerpoint/2010/main" id="1" dur="indefinite" restart="never" nodeType="tmRoot"/>
       </p:par>
     </p:tnLst>
   </p:timing>

</xml_diff>